<commit_message>
Added data to table
</commit_message>
<xml_diff>
--- a/Poster.pptx
+++ b/Poster.pptx
@@ -193,6 +193,387 @@
 </p:presentation>
 </file>
 
+<file path=ppt/changesInfos/changesInfo1.xml><?xml version="1.0" encoding="utf-8"?>
+<pc:chgInfo xmlns:a="http://schemas.openxmlformats.org/drawingml/2006/main" xmlns:r="http://schemas.openxmlformats.org/officeDocument/2006/relationships" xmlns:ac="http://schemas.microsoft.com/office/drawing/2013/main/command" xmlns:pc="http://schemas.microsoft.com/office/powerpoint/2013/main/command">
+  <pc:docChgLst>
+    <pc:chgData name="Simon Schrodi" userId="81bc418df28a388d" providerId="LiveId" clId="{71DDAB47-B9AD-4D8A-87D2-C8342A0DA6E2}"/>
+    <pc:docChg chg="undo custSel modSld">
+      <pc:chgData name="Simon Schrodi" userId="81bc418df28a388d" providerId="LiveId" clId="{71DDAB47-B9AD-4D8A-87D2-C8342A0DA6E2}" dt="2020-02-18T13:12:41.358" v="604" actId="1038"/>
+      <pc:docMkLst>
+        <pc:docMk/>
+      </pc:docMkLst>
+      <pc:sldChg chg="addSp delSp modSp">
+        <pc:chgData name="Simon Schrodi" userId="81bc418df28a388d" providerId="LiveId" clId="{71DDAB47-B9AD-4D8A-87D2-C8342A0DA6E2}" dt="2020-02-18T13:12:41.358" v="604" actId="1038"/>
+        <pc:sldMkLst>
+          <pc:docMk/>
+          <pc:sldMk cId="0" sldId="259"/>
+        </pc:sldMkLst>
+        <pc:spChg chg="mod">
+          <ac:chgData name="Simon Schrodi" userId="81bc418df28a388d" providerId="LiveId" clId="{71DDAB47-B9AD-4D8A-87D2-C8342A0DA6E2}" dt="2020-02-13T09:33:20.423" v="120"/>
+          <ac:spMkLst>
+            <pc:docMk/>
+            <pc:sldMk cId="0" sldId="259"/>
+            <ac:spMk id="22" creationId="{3A40489C-474C-41AB-BDEF-71A805FF8BEF}"/>
+          </ac:spMkLst>
+        </pc:spChg>
+        <pc:spChg chg="mod">
+          <ac:chgData name="Simon Schrodi" userId="81bc418df28a388d" providerId="LiveId" clId="{71DDAB47-B9AD-4D8A-87D2-C8342A0DA6E2}" dt="2020-02-13T09:33:20.423" v="119"/>
+          <ac:spMkLst>
+            <pc:docMk/>
+            <pc:sldMk cId="0" sldId="259"/>
+            <ac:spMk id="30" creationId="{00000000-0000-0000-0000-000000000000}"/>
+          </ac:spMkLst>
+        </pc:spChg>
+        <pc:spChg chg="mod">
+          <ac:chgData name="Simon Schrodi" userId="81bc418df28a388d" providerId="LiveId" clId="{71DDAB47-B9AD-4D8A-87D2-C8342A0DA6E2}" dt="2020-02-13T09:33:20.423" v="113"/>
+          <ac:spMkLst>
+            <pc:docMk/>
+            <pc:sldMk cId="0" sldId="259"/>
+            <ac:spMk id="33" creationId="{00000000-0000-0000-0000-000000000000}"/>
+          </ac:spMkLst>
+        </pc:spChg>
+        <pc:spChg chg="mod">
+          <ac:chgData name="Simon Schrodi" userId="81bc418df28a388d" providerId="LiveId" clId="{71DDAB47-B9AD-4D8A-87D2-C8342A0DA6E2}" dt="2020-02-13T09:33:20.423" v="114"/>
+          <ac:spMkLst>
+            <pc:docMk/>
+            <pc:sldMk cId="0" sldId="259"/>
+            <ac:spMk id="34" creationId="{00000000-0000-0000-0000-000000000000}"/>
+          </ac:spMkLst>
+        </pc:spChg>
+        <pc:spChg chg="mod">
+          <ac:chgData name="Simon Schrodi" userId="81bc418df28a388d" providerId="LiveId" clId="{71DDAB47-B9AD-4D8A-87D2-C8342A0DA6E2}" dt="2020-02-13T09:33:20.423" v="115"/>
+          <ac:spMkLst>
+            <pc:docMk/>
+            <pc:sldMk cId="0" sldId="259"/>
+            <ac:spMk id="48" creationId="{00000000-0000-0000-0000-000000000000}"/>
+          </ac:spMkLst>
+        </pc:spChg>
+        <pc:spChg chg="mod">
+          <ac:chgData name="Simon Schrodi" userId="81bc418df28a388d" providerId="LiveId" clId="{71DDAB47-B9AD-4D8A-87D2-C8342A0DA6E2}" dt="2020-02-13T09:33:20.408" v="111"/>
+          <ac:spMkLst>
+            <pc:docMk/>
+            <pc:sldMk cId="0" sldId="259"/>
+            <ac:spMk id="49" creationId="{00000000-0000-0000-0000-000000000000}"/>
+          </ac:spMkLst>
+        </pc:spChg>
+        <pc:spChg chg="del mod">
+          <ac:chgData name="Simon Schrodi" userId="81bc418df28a388d" providerId="LiveId" clId="{71DDAB47-B9AD-4D8A-87D2-C8342A0DA6E2}" dt="2020-02-13T10:46:26.518" v="489" actId="478"/>
+          <ac:spMkLst>
+            <pc:docMk/>
+            <pc:sldMk cId="0" sldId="259"/>
+            <ac:spMk id="50" creationId="{00000000-0000-0000-0000-000000000000}"/>
+          </ac:spMkLst>
+        </pc:spChg>
+        <pc:spChg chg="mod">
+          <ac:chgData name="Simon Schrodi" userId="81bc418df28a388d" providerId="LiveId" clId="{71DDAB47-B9AD-4D8A-87D2-C8342A0DA6E2}" dt="2020-02-13T09:33:20.423" v="117"/>
+          <ac:spMkLst>
+            <pc:docMk/>
+            <pc:sldMk cId="0" sldId="259"/>
+            <ac:spMk id="54" creationId="{00000000-0000-0000-0000-000000000000}"/>
+          </ac:spMkLst>
+        </pc:spChg>
+        <pc:spChg chg="mod">
+          <ac:chgData name="Simon Schrodi" userId="81bc418df28a388d" providerId="LiveId" clId="{71DDAB47-B9AD-4D8A-87D2-C8342A0DA6E2}" dt="2020-02-17T20:17:02.609" v="601" actId="20577"/>
+          <ac:spMkLst>
+            <pc:docMk/>
+            <pc:sldMk cId="0" sldId="259"/>
+            <ac:spMk id="55" creationId="{00000000-0000-0000-0000-000000000000}"/>
+          </ac:spMkLst>
+        </pc:spChg>
+        <pc:spChg chg="mod">
+          <ac:chgData name="Simon Schrodi" userId="81bc418df28a388d" providerId="LiveId" clId="{71DDAB47-B9AD-4D8A-87D2-C8342A0DA6E2}" dt="2020-02-13T09:33:20.408" v="112"/>
+          <ac:spMkLst>
+            <pc:docMk/>
+            <pc:sldMk cId="0" sldId="259"/>
+            <ac:spMk id="464" creationId="{00000000-0000-0000-0000-000000000000}"/>
+          </ac:spMkLst>
+        </pc:spChg>
+        <pc:graphicFrameChg chg="add del mod modGraphic">
+          <ac:chgData name="Simon Schrodi" userId="81bc418df28a388d" providerId="LiveId" clId="{71DDAB47-B9AD-4D8A-87D2-C8342A0DA6E2}" dt="2020-02-13T09:31:31.401" v="103" actId="478"/>
+          <ac:graphicFrameMkLst>
+            <pc:docMk/>
+            <pc:sldMk cId="0" sldId="259"/>
+            <ac:graphicFrameMk id="2" creationId="{AD123806-C1DB-432C-98E6-7EE33AEB432F}"/>
+          </ac:graphicFrameMkLst>
+        </pc:graphicFrameChg>
+        <pc:picChg chg="del mod ord">
+          <ac:chgData name="Simon Schrodi" userId="81bc418df28a388d" providerId="LiveId" clId="{71DDAB47-B9AD-4D8A-87D2-C8342A0DA6E2}" dt="2020-02-17T20:14:45.227" v="521" actId="478"/>
+          <ac:picMkLst>
+            <pc:docMk/>
+            <pc:sldMk cId="0" sldId="259"/>
+            <ac:picMk id="3" creationId="{355A9807-A193-4EBD-AB9F-BB1C89F95B65}"/>
+          </ac:picMkLst>
+        </pc:picChg>
+        <pc:picChg chg="mod ord">
+          <ac:chgData name="Simon Schrodi" userId="81bc418df28a388d" providerId="LiveId" clId="{71DDAB47-B9AD-4D8A-87D2-C8342A0DA6E2}" dt="2020-02-18T13:12:41.358" v="604" actId="1038"/>
+          <ac:picMkLst>
+            <pc:docMk/>
+            <pc:sldMk cId="0" sldId="259"/>
+            <ac:picMk id="5" creationId="{51C5D699-EB2E-4575-BAD6-0EB6E001DB85}"/>
+          </ac:picMkLst>
+        </pc:picChg>
+        <pc:picChg chg="del mod">
+          <ac:chgData name="Simon Schrodi" userId="81bc418df28a388d" providerId="LiveId" clId="{71DDAB47-B9AD-4D8A-87D2-C8342A0DA6E2}" dt="2020-02-13T09:34:46.194" v="132" actId="478"/>
+          <ac:picMkLst>
+            <pc:docMk/>
+            <pc:sldMk cId="0" sldId="259"/>
+            <ac:picMk id="5" creationId="{59EB7049-4036-40A1-82DC-AD13AFD8EB5A}"/>
+          </ac:picMkLst>
+        </pc:picChg>
+        <pc:picChg chg="del mod ord">
+          <ac:chgData name="Simon Schrodi" userId="81bc418df28a388d" providerId="LiveId" clId="{71DDAB47-B9AD-4D8A-87D2-C8342A0DA6E2}" dt="2020-02-13T09:35:49.155" v="144" actId="478"/>
+          <ac:picMkLst>
+            <pc:docMk/>
+            <pc:sldMk cId="0" sldId="259"/>
+            <ac:picMk id="7" creationId="{0275A05E-1E68-46EA-8784-DF60CC62449A}"/>
+          </ac:picMkLst>
+        </pc:picChg>
+        <pc:picChg chg="del mod ord">
+          <ac:chgData name="Simon Schrodi" userId="81bc418df28a388d" providerId="LiveId" clId="{71DDAB47-B9AD-4D8A-87D2-C8342A0DA6E2}" dt="2020-02-13T09:36:04.792" v="156" actId="478"/>
+          <ac:picMkLst>
+            <pc:docMk/>
+            <pc:sldMk cId="0" sldId="259"/>
+            <ac:picMk id="9" creationId="{C14017DB-F362-40FE-9DCA-210DD7F3526B}"/>
+          </ac:picMkLst>
+        </pc:picChg>
+        <pc:picChg chg="del mod ord">
+          <ac:chgData name="Simon Schrodi" userId="81bc418df28a388d" providerId="LiveId" clId="{71DDAB47-B9AD-4D8A-87D2-C8342A0DA6E2}" dt="2020-02-13T09:36:40.155" v="168" actId="478"/>
+          <ac:picMkLst>
+            <pc:docMk/>
+            <pc:sldMk cId="0" sldId="259"/>
+            <ac:picMk id="11" creationId="{836E7F9A-A530-4BE8-89CA-1BBB728E360B}"/>
+          </ac:picMkLst>
+        </pc:picChg>
+        <pc:picChg chg="del mod ord">
+          <ac:chgData name="Simon Schrodi" userId="81bc418df28a388d" providerId="LiveId" clId="{71DDAB47-B9AD-4D8A-87D2-C8342A0DA6E2}" dt="2020-02-13T09:37:27.274" v="180" actId="478"/>
+          <ac:picMkLst>
+            <pc:docMk/>
+            <pc:sldMk cId="0" sldId="259"/>
+            <ac:picMk id="13" creationId="{63FFF11A-DB10-46AF-8807-D4EB690D62B3}"/>
+          </ac:picMkLst>
+        </pc:picChg>
+        <pc:picChg chg="add del mod ord">
+          <ac:chgData name="Simon Schrodi" userId="81bc418df28a388d" providerId="LiveId" clId="{71DDAB47-B9AD-4D8A-87D2-C8342A0DA6E2}" dt="2020-02-13T09:39:24.732" v="221" actId="478"/>
+          <ac:picMkLst>
+            <pc:docMk/>
+            <pc:sldMk cId="0" sldId="259"/>
+            <ac:picMk id="15" creationId="{62350202-015A-43DB-A5EE-217BBE275DB5}"/>
+          </ac:picMkLst>
+        </pc:picChg>
+        <pc:picChg chg="del mod ord">
+          <ac:chgData name="Simon Schrodi" userId="81bc418df28a388d" providerId="LiveId" clId="{71DDAB47-B9AD-4D8A-87D2-C8342A0DA6E2}" dt="2020-02-13T09:37:54.125" v="208"/>
+          <ac:picMkLst>
+            <pc:docMk/>
+            <pc:sldMk cId="0" sldId="259"/>
+            <ac:picMk id="17" creationId="{664483C3-BE78-4DE7-AE3F-F02CC20ACD82}"/>
+          </ac:picMkLst>
+        </pc:picChg>
+        <pc:picChg chg="del mod ord">
+          <ac:chgData name="Simon Schrodi" userId="81bc418df28a388d" providerId="LiveId" clId="{71DDAB47-B9AD-4D8A-87D2-C8342A0DA6E2}" dt="2020-02-13T09:40:04.181" v="233" actId="478"/>
+          <ac:picMkLst>
+            <pc:docMk/>
+            <pc:sldMk cId="0" sldId="259"/>
+            <ac:picMk id="19" creationId="{E4682FAA-B325-48B1-96BA-421768BCD64C}"/>
+          </ac:picMkLst>
+        </pc:picChg>
+        <pc:picChg chg="del mod ord">
+          <ac:chgData name="Simon Schrodi" userId="81bc418df28a388d" providerId="LiveId" clId="{71DDAB47-B9AD-4D8A-87D2-C8342A0DA6E2}" dt="2020-02-13T09:40:16.192" v="245" actId="478"/>
+          <ac:picMkLst>
+            <pc:docMk/>
+            <pc:sldMk cId="0" sldId="259"/>
+            <ac:picMk id="21" creationId="{24B36F9C-7719-4474-A59D-26FCC9D27353}"/>
+          </ac:picMkLst>
+        </pc:picChg>
+        <pc:picChg chg="del mod ord">
+          <ac:chgData name="Simon Schrodi" userId="81bc418df28a388d" providerId="LiveId" clId="{71DDAB47-B9AD-4D8A-87D2-C8342A0DA6E2}" dt="2020-02-13T09:41:00.596" v="257" actId="478"/>
+          <ac:picMkLst>
+            <pc:docMk/>
+            <pc:sldMk cId="0" sldId="259"/>
+            <ac:picMk id="24" creationId="{AC13F605-C2B1-453D-ADD5-49A477518E6A}"/>
+          </ac:picMkLst>
+        </pc:picChg>
+        <pc:picChg chg="del mod ord">
+          <ac:chgData name="Simon Schrodi" userId="81bc418df28a388d" providerId="LiveId" clId="{71DDAB47-B9AD-4D8A-87D2-C8342A0DA6E2}" dt="2020-02-13T09:41:29.985" v="269" actId="478"/>
+          <ac:picMkLst>
+            <pc:docMk/>
+            <pc:sldMk cId="0" sldId="259"/>
+            <ac:picMk id="26" creationId="{D7B989D0-127C-4C66-9F3A-8A69D89E6C80}"/>
+          </ac:picMkLst>
+        </pc:picChg>
+        <pc:picChg chg="del mod ord">
+          <ac:chgData name="Simon Schrodi" userId="81bc418df28a388d" providerId="LiveId" clId="{71DDAB47-B9AD-4D8A-87D2-C8342A0DA6E2}" dt="2020-02-13T09:41:42.929" v="281" actId="478"/>
+          <ac:picMkLst>
+            <pc:docMk/>
+            <pc:sldMk cId="0" sldId="259"/>
+            <ac:picMk id="29" creationId="{591847B4-2DC4-4546-9D66-F147E39CF0E8}"/>
+          </ac:picMkLst>
+        </pc:picChg>
+        <pc:picChg chg="del mod ord">
+          <ac:chgData name="Simon Schrodi" userId="81bc418df28a388d" providerId="LiveId" clId="{71DDAB47-B9AD-4D8A-87D2-C8342A0DA6E2}" dt="2020-02-13T10:42:15.888" v="488" actId="478"/>
+          <ac:picMkLst>
+            <pc:docMk/>
+            <pc:sldMk cId="0" sldId="259"/>
+            <ac:picMk id="35" creationId="{45880975-4CEB-4810-9429-956F6923413B}"/>
+          </ac:picMkLst>
+        </pc:picChg>
+        <pc:picChg chg="del mod ord">
+          <ac:chgData name="Simon Schrodi" userId="81bc418df28a388d" providerId="LiveId" clId="{71DDAB47-B9AD-4D8A-87D2-C8342A0DA6E2}" dt="2020-02-17T20:11:14.217" v="507" actId="478"/>
+          <ac:picMkLst>
+            <pc:docMk/>
+            <pc:sldMk cId="0" sldId="259"/>
+            <ac:picMk id="37" creationId="{FEB38E3C-257D-4C4C-92C9-4841DA010152}"/>
+          </ac:picMkLst>
+        </pc:picChg>
+        <pc:picChg chg="add mod">
+          <ac:chgData name="Simon Schrodi" userId="81bc418df28a388d" providerId="LiveId" clId="{71DDAB47-B9AD-4D8A-87D2-C8342A0DA6E2}" dt="2020-02-17T20:16:19.756" v="586" actId="1076"/>
+          <ac:picMkLst>
+            <pc:docMk/>
+            <pc:sldMk cId="0" sldId="259"/>
+            <ac:picMk id="38" creationId="{B9131E9E-A3AD-4A78-AC09-10DBBC557196}"/>
+          </ac:picMkLst>
+        </pc:picChg>
+        <pc:picChg chg="add mod">
+          <ac:chgData name="Simon Schrodi" userId="81bc418df28a388d" providerId="LiveId" clId="{71DDAB47-B9AD-4D8A-87D2-C8342A0DA6E2}" dt="2020-02-17T20:16:26.695" v="587" actId="1076"/>
+          <ac:picMkLst>
+            <pc:docMk/>
+            <pc:sldMk cId="0" sldId="259"/>
+            <ac:picMk id="39" creationId="{B3A4D0DA-CF4E-4214-A806-178A5E86AD0D}"/>
+          </ac:picMkLst>
+        </pc:picChg>
+        <pc:picChg chg="del mod ord">
+          <ac:chgData name="Simon Schrodi" userId="81bc418df28a388d" providerId="LiveId" clId="{71DDAB47-B9AD-4D8A-87D2-C8342A0DA6E2}" dt="2020-02-13T09:48:53.889" v="293" actId="478"/>
+          <ac:picMkLst>
+            <pc:docMk/>
+            <pc:sldMk cId="0" sldId="259"/>
+            <ac:picMk id="448" creationId="{DE6EDBCD-744B-4F8F-BE81-8E973BD59EA7}"/>
+          </ac:picMkLst>
+        </pc:picChg>
+        <pc:picChg chg="del mod ord">
+          <ac:chgData name="Simon Schrodi" userId="81bc418df28a388d" providerId="LiveId" clId="{71DDAB47-B9AD-4D8A-87D2-C8342A0DA6E2}" dt="2020-02-13T09:53:19.577" v="306" actId="478"/>
+          <ac:picMkLst>
+            <pc:docMk/>
+            <pc:sldMk cId="0" sldId="259"/>
+            <ac:picMk id="450" creationId="{BB318DA2-BB15-4D80-85EF-CF3CF0FB63C0}"/>
+          </ac:picMkLst>
+        </pc:picChg>
+        <pc:picChg chg="del mod ord">
+          <ac:chgData name="Simon Schrodi" userId="81bc418df28a388d" providerId="LiveId" clId="{71DDAB47-B9AD-4D8A-87D2-C8342A0DA6E2}" dt="2020-02-13T09:54:05.701" v="318" actId="478"/>
+          <ac:picMkLst>
+            <pc:docMk/>
+            <pc:sldMk cId="0" sldId="259"/>
+            <ac:picMk id="452" creationId="{453D7454-813C-4F63-8684-060A14F1398A}"/>
+          </ac:picMkLst>
+        </pc:picChg>
+        <pc:picChg chg="del mod ord">
+          <ac:chgData name="Simon Schrodi" userId="81bc418df28a388d" providerId="LiveId" clId="{71DDAB47-B9AD-4D8A-87D2-C8342A0DA6E2}" dt="2020-02-13T09:54:33.139" v="330" actId="478"/>
+          <ac:picMkLst>
+            <pc:docMk/>
+            <pc:sldMk cId="0" sldId="259"/>
+            <ac:picMk id="454" creationId="{350A3EA3-2F0A-4D95-82EA-87B7ED9B5C14}"/>
+          </ac:picMkLst>
+        </pc:picChg>
+        <pc:picChg chg="del mod ord">
+          <ac:chgData name="Simon Schrodi" userId="81bc418df28a388d" providerId="LiveId" clId="{71DDAB47-B9AD-4D8A-87D2-C8342A0DA6E2}" dt="2020-02-13T09:55:21.374" v="342" actId="478"/>
+          <ac:picMkLst>
+            <pc:docMk/>
+            <pc:sldMk cId="0" sldId="259"/>
+            <ac:picMk id="456" creationId="{64C5FFC3-EE04-4FF2-AA50-F43B47F0EAD6}"/>
+          </ac:picMkLst>
+        </pc:picChg>
+        <pc:picChg chg="del mod ord">
+          <ac:chgData name="Simon Schrodi" userId="81bc418df28a388d" providerId="LiveId" clId="{71DDAB47-B9AD-4D8A-87D2-C8342A0DA6E2}" dt="2020-02-13T09:55:57.050" v="355" actId="478"/>
+          <ac:picMkLst>
+            <pc:docMk/>
+            <pc:sldMk cId="0" sldId="259"/>
+            <ac:picMk id="458" creationId="{F4110757-0AAE-40A4-B375-4FEA007794C1}"/>
+          </ac:picMkLst>
+        </pc:picChg>
+        <pc:picChg chg="del mod ord">
+          <ac:chgData name="Simon Schrodi" userId="81bc418df28a388d" providerId="LiveId" clId="{71DDAB47-B9AD-4D8A-87D2-C8342A0DA6E2}" dt="2020-02-13T09:56:13.461" v="367" actId="478"/>
+          <ac:picMkLst>
+            <pc:docMk/>
+            <pc:sldMk cId="0" sldId="259"/>
+            <ac:picMk id="460" creationId="{CE8EA1B8-BBF1-483E-88F5-38FD0EFF6542}"/>
+          </ac:picMkLst>
+        </pc:picChg>
+        <pc:picChg chg="del mod ord">
+          <ac:chgData name="Simon Schrodi" userId="81bc418df28a388d" providerId="LiveId" clId="{71DDAB47-B9AD-4D8A-87D2-C8342A0DA6E2}" dt="2020-02-13T09:57:00.620" v="379" actId="478"/>
+          <ac:picMkLst>
+            <pc:docMk/>
+            <pc:sldMk cId="0" sldId="259"/>
+            <ac:picMk id="462" creationId="{F96A9A74-A53A-44F8-9677-A20B9809CF96}"/>
+          </ac:picMkLst>
+        </pc:picChg>
+        <pc:picChg chg="del mod ord">
+          <ac:chgData name="Simon Schrodi" userId="81bc418df28a388d" providerId="LiveId" clId="{71DDAB47-B9AD-4D8A-87D2-C8342A0DA6E2}" dt="2020-02-13T09:57:15.089" v="391" actId="478"/>
+          <ac:picMkLst>
+            <pc:docMk/>
+            <pc:sldMk cId="0" sldId="259"/>
+            <ac:picMk id="465" creationId="{C2BC3EAC-C1A1-4659-B24E-AC2118288210}"/>
+          </ac:picMkLst>
+        </pc:picChg>
+        <pc:picChg chg="del mod ord">
+          <ac:chgData name="Simon Schrodi" userId="81bc418df28a388d" providerId="LiveId" clId="{71DDAB47-B9AD-4D8A-87D2-C8342A0DA6E2}" dt="2020-02-13T09:57:40.298" v="403" actId="478"/>
+          <ac:picMkLst>
+            <pc:docMk/>
+            <pc:sldMk cId="0" sldId="259"/>
+            <ac:picMk id="467" creationId="{359C9C93-1E82-4518-A2E5-122BD668715D}"/>
+          </ac:picMkLst>
+        </pc:picChg>
+        <pc:picChg chg="del mod ord">
+          <ac:chgData name="Simon Schrodi" userId="81bc418df28a388d" providerId="LiveId" clId="{71DDAB47-B9AD-4D8A-87D2-C8342A0DA6E2}" dt="2020-02-13T09:58:18.001" v="413" actId="478"/>
+          <ac:picMkLst>
+            <pc:docMk/>
+            <pc:sldMk cId="0" sldId="259"/>
+            <ac:picMk id="469" creationId="{D5420AD2-97CA-4ADF-A716-2E6982837833}"/>
+          </ac:picMkLst>
+        </pc:picChg>
+        <pc:picChg chg="del mod ord">
+          <ac:chgData name="Simon Schrodi" userId="81bc418df28a388d" providerId="LiveId" clId="{71DDAB47-B9AD-4D8A-87D2-C8342A0DA6E2}" dt="2020-02-13T09:59:21.248" v="428" actId="478"/>
+          <ac:picMkLst>
+            <pc:docMk/>
+            <pc:sldMk cId="0" sldId="259"/>
+            <ac:picMk id="471" creationId="{7C09CA6C-8461-4DBE-B2D3-A3F0A9F3FBCF}"/>
+          </ac:picMkLst>
+        </pc:picChg>
+        <pc:picChg chg="del mod ord">
+          <ac:chgData name="Simon Schrodi" userId="81bc418df28a388d" providerId="LiveId" clId="{71DDAB47-B9AD-4D8A-87D2-C8342A0DA6E2}" dt="2020-02-13T09:59:46.604" v="440" actId="478"/>
+          <ac:picMkLst>
+            <pc:docMk/>
+            <pc:sldMk cId="0" sldId="259"/>
+            <ac:picMk id="473" creationId="{2199D159-7923-4183-88D7-373E18C535C1}"/>
+          </ac:picMkLst>
+        </pc:picChg>
+        <pc:picChg chg="del mod ord">
+          <ac:chgData name="Simon Schrodi" userId="81bc418df28a388d" providerId="LiveId" clId="{71DDAB47-B9AD-4D8A-87D2-C8342A0DA6E2}" dt="2020-02-13T09:59:58.527" v="452" actId="478"/>
+          <ac:picMkLst>
+            <pc:docMk/>
+            <pc:sldMk cId="0" sldId="259"/>
+            <ac:picMk id="475" creationId="{8522D20F-A798-4303-BD4C-86BA72228706}"/>
+          </ac:picMkLst>
+        </pc:picChg>
+        <pc:picChg chg="del mod ord">
+          <ac:chgData name="Simon Schrodi" userId="81bc418df28a388d" providerId="LiveId" clId="{71DDAB47-B9AD-4D8A-87D2-C8342A0DA6E2}" dt="2020-02-13T10:13:52.129" v="464" actId="478"/>
+          <ac:picMkLst>
+            <pc:docMk/>
+            <pc:sldMk cId="0" sldId="259"/>
+            <ac:picMk id="477" creationId="{8900C315-7A19-4BB1-ADB5-507FF07E78D2}"/>
+          </ac:picMkLst>
+        </pc:picChg>
+        <pc:picChg chg="del mod ord">
+          <ac:chgData name="Simon Schrodi" userId="81bc418df28a388d" providerId="LiveId" clId="{71DDAB47-B9AD-4D8A-87D2-C8342A0DA6E2}" dt="2020-02-13T10:31:56.951" v="476" actId="478"/>
+          <ac:picMkLst>
+            <pc:docMk/>
+            <pc:sldMk cId="0" sldId="259"/>
+            <ac:picMk id="479" creationId="{3B473CBD-BB17-472D-97E9-8D7ECC6FBC96}"/>
+          </ac:picMkLst>
+        </pc:picChg>
+      </pc:sldChg>
+    </pc:docChg>
+  </pc:docChgLst>
+</pc:chgInfo>
+</file>
+
 <file path=ppt/handoutMasters/handoutMaster1.xml><?xml version="1.0" encoding="utf-8"?>
 <p:handoutMaster xmlns:a="http://schemas.openxmlformats.org/drawingml/2006/main" xmlns:r="http://schemas.openxmlformats.org/officeDocument/2006/relationships" xmlns:p="http://schemas.openxmlformats.org/presentationml/2006/main">
   <p:cSld>
@@ -365,7 +746,7 @@
               <a:pPr>
                 <a:defRPr/>
               </a:pPr>
-              <a:t>13.02.2020</a:t>
+              <a:t>17.02.2020</a:t>
             </a:fld>
             <a:endParaRPr lang="de-DE" altLang="en-US"/>
           </a:p>
@@ -617,7 +998,7 @@
           <a:p>
             <a:fld id="{E6F50657-AFEF-4BFF-AFF0-10812088926E}" type="datetimeFigureOut">
               <a:rPr lang="en-US" smtClean="0"/>
-              <a:t>2/13/2020</a:t>
+              <a:t>2/17/2020</a:t>
             </a:fld>
             <a:endParaRPr lang="en-US"/>
           </a:p>
@@ -3785,7 +4166,7 @@
       </p:grpSpPr>
       <p:sp>
         <p:nvSpPr>
-          <p:cNvPr id="49" name="Textplatzhalter 3"/>
+          <p:cNvPr id="49" name="Textplatzhalter 3 1"/>
           <p:cNvSpPr>
             <a:spLocks/>
           </p:cNvSpPr>
@@ -4201,7 +4582,7 @@
       </p:sp>
       <p:sp>
         <p:nvSpPr>
-          <p:cNvPr id="464" name="Textplatzhalter 3"/>
+          <p:cNvPr id="464" name="Textplatzhalter 3 2"/>
           <p:cNvSpPr>
             <a:spLocks/>
           </p:cNvSpPr>
@@ -4480,7 +4861,7 @@
           <p:nvPr/>
         </p:nvPicPr>
         <p:blipFill>
-          <a:blip r:embed="rId3">
+          <a:blip r:embed="rId4">
             <a:extLst>
               <a:ext uri="{28A0092B-C50C-407E-A947-70E740481C1C}">
                 <a14:useLocalDpi xmlns:a14="http://schemas.microsoft.com/office/drawing/2010/main" val="0"/>
@@ -4503,7 +4884,7 @@
       </p:pic>
       <p:sp>
         <p:nvSpPr>
-          <p:cNvPr id="33" name="Line 191"/>
+          <p:cNvPr id="33" name="Line 191 1"/>
           <p:cNvSpPr>
             <a:spLocks noChangeShapeType="1"/>
           </p:cNvSpPr>
@@ -4554,7 +4935,7 @@
       </p:sp>
       <p:sp>
         <p:nvSpPr>
-          <p:cNvPr id="34" name="Line 191"/>
+          <p:cNvPr id="34" name="Line 191 2"/>
           <p:cNvSpPr>
             <a:spLocks noChangeShapeType="1"/>
           </p:cNvSpPr>
@@ -4605,7 +4986,7 @@
       </p:sp>
       <p:sp>
         <p:nvSpPr>
-          <p:cNvPr id="48" name="Line 191"/>
+          <p:cNvPr id="48" name="Line 191 3"/>
           <p:cNvSpPr>
             <a:spLocks noChangeShapeType="1"/>
           </p:cNvSpPr>
@@ -4656,299 +5037,7 @@
       </p:sp>
       <p:sp>
         <p:nvSpPr>
-          <p:cNvPr id="50" name="Textplatzhalter 3"/>
-          <p:cNvSpPr>
-            <a:spLocks/>
-          </p:cNvSpPr>
-          <p:nvPr/>
-        </p:nvSpPr>
-        <p:spPr bwMode="auto">
-          <a:xfrm>
-            <a:off x="15401017" y="12919842"/>
-            <a:ext cx="13258800" cy="4795159"/>
-          </a:xfrm>
-          <a:prstGeom prst="rect">
-            <a:avLst/>
-          </a:prstGeom>
-          <a:noFill/>
-          <a:ln>
-            <a:noFill/>
-          </a:ln>
-          <a:extLst>
-            <a:ext uri="{909E8E84-426E-40DD-AFC4-6F175D3DCCD1}">
-              <a14:hiddenFill xmlns:a14="http://schemas.microsoft.com/office/drawing/2010/main">
-                <a:solidFill>
-                  <a:srgbClr val="FFFFFF"/>
-                </a:solidFill>
-              </a14:hiddenFill>
-            </a:ext>
-            <a:ext uri="{91240B29-F687-4F45-9708-019B960494DF}">
-              <a14:hiddenLine xmlns:a14="http://schemas.microsoft.com/office/drawing/2010/main" w="9525">
-                <a:solidFill>
-                  <a:srgbClr val="000000"/>
-                </a:solidFill>
-                <a:miter lim="800000"/>
-                <a:headEnd/>
-                <a:tailEnd/>
-              </a14:hiddenLine>
-            </a:ext>
-          </a:extLst>
-        </p:spPr>
-        <p:txBody>
-          <a:bodyPr wrap="square" lIns="0" tIns="0" rIns="0" bIns="0">
-            <a:spAutoFit/>
-          </a:bodyPr>
-          <a:lstStyle>
-            <a:lvl1pPr eaLnBrk="0" hangingPunct="0">
-              <a:spcBef>
-                <a:spcPct val="20000"/>
-              </a:spcBef>
-              <a:buFont typeface="Arial" charset="0"/>
-              <a:buChar char="•"/>
-              <a:defRPr sz="14600">
-                <a:solidFill>
-                  <a:schemeClr val="tx1"/>
-                </a:solidFill>
-                <a:latin typeface="Calibri" pitchFamily="34" charset="0"/>
-                <a:ea typeface="Geneva" pitchFamily="50" charset="-128"/>
-              </a:defRPr>
-            </a:lvl1pPr>
-            <a:lvl2pPr marL="37872988" indent="-37415788" eaLnBrk="0" hangingPunct="0">
-              <a:spcBef>
-                <a:spcPct val="20000"/>
-              </a:spcBef>
-              <a:buFont typeface="Arial" charset="0"/>
-              <a:buChar char="–"/>
-              <a:defRPr sz="12800">
-                <a:solidFill>
-                  <a:schemeClr val="tx1"/>
-                </a:solidFill>
-                <a:latin typeface="Calibri" pitchFamily="34" charset="0"/>
-                <a:ea typeface="Geneva" pitchFamily="50" charset="-128"/>
-              </a:defRPr>
-            </a:lvl2pPr>
-            <a:lvl3pPr marL="5219700" indent="-1044575" eaLnBrk="0" hangingPunct="0">
-              <a:spcBef>
-                <a:spcPct val="20000"/>
-              </a:spcBef>
-              <a:buFont typeface="Arial" charset="0"/>
-              <a:buChar char="•"/>
-              <a:defRPr sz="11000">
-                <a:solidFill>
-                  <a:schemeClr val="tx1"/>
-                </a:solidFill>
-                <a:latin typeface="Calibri" pitchFamily="34" charset="0"/>
-                <a:ea typeface="Geneva" pitchFamily="50" charset="-128"/>
-              </a:defRPr>
-            </a:lvl3pPr>
-            <a:lvl4pPr marL="7307263" indent="-1042988" eaLnBrk="0" hangingPunct="0">
-              <a:spcBef>
-                <a:spcPct val="20000"/>
-              </a:spcBef>
-              <a:buFont typeface="Arial" charset="0"/>
-              <a:buChar char="–"/>
-              <a:defRPr sz="9100">
-                <a:solidFill>
-                  <a:schemeClr val="tx1"/>
-                </a:solidFill>
-                <a:latin typeface="Calibri" pitchFamily="34" charset="0"/>
-                <a:ea typeface="Geneva" pitchFamily="50" charset="-128"/>
-              </a:defRPr>
-            </a:lvl4pPr>
-            <a:lvl5pPr marL="9388475" indent="-1036638" eaLnBrk="0" hangingPunct="0">
-              <a:spcBef>
-                <a:spcPct val="20000"/>
-              </a:spcBef>
-              <a:buFont typeface="Arial" charset="0"/>
-              <a:buChar char="»"/>
-              <a:defRPr sz="9100">
-                <a:solidFill>
-                  <a:schemeClr val="tx1"/>
-                </a:solidFill>
-                <a:latin typeface="Calibri" pitchFamily="34" charset="0"/>
-                <a:ea typeface="Geneva" pitchFamily="50" charset="-128"/>
-              </a:defRPr>
-            </a:lvl5pPr>
-            <a:lvl6pPr marL="9845675" indent="-1036638" defTabSz="2087563" eaLnBrk="0" fontAlgn="base" hangingPunct="0">
-              <a:spcBef>
-                <a:spcPct val="20000"/>
-              </a:spcBef>
-              <a:spcAft>
-                <a:spcPct val="0"/>
-              </a:spcAft>
-              <a:buFont typeface="Arial" charset="0"/>
-              <a:buChar char="»"/>
-              <a:defRPr sz="9100">
-                <a:solidFill>
-                  <a:schemeClr val="tx1"/>
-                </a:solidFill>
-                <a:latin typeface="Calibri" pitchFamily="34" charset="0"/>
-                <a:ea typeface="Geneva" pitchFamily="50" charset="-128"/>
-              </a:defRPr>
-            </a:lvl6pPr>
-            <a:lvl7pPr marL="10302875" indent="-1036638" defTabSz="2087563" eaLnBrk="0" fontAlgn="base" hangingPunct="0">
-              <a:spcBef>
-                <a:spcPct val="20000"/>
-              </a:spcBef>
-              <a:spcAft>
-                <a:spcPct val="0"/>
-              </a:spcAft>
-              <a:buFont typeface="Arial" charset="0"/>
-              <a:buChar char="»"/>
-              <a:defRPr sz="9100">
-                <a:solidFill>
-                  <a:schemeClr val="tx1"/>
-                </a:solidFill>
-                <a:latin typeface="Calibri" pitchFamily="34" charset="0"/>
-                <a:ea typeface="Geneva" pitchFamily="50" charset="-128"/>
-              </a:defRPr>
-            </a:lvl7pPr>
-            <a:lvl8pPr marL="10760075" indent="-1036638" defTabSz="2087563" eaLnBrk="0" fontAlgn="base" hangingPunct="0">
-              <a:spcBef>
-                <a:spcPct val="20000"/>
-              </a:spcBef>
-              <a:spcAft>
-                <a:spcPct val="0"/>
-              </a:spcAft>
-              <a:buFont typeface="Arial" charset="0"/>
-              <a:buChar char="»"/>
-              <a:defRPr sz="9100">
-                <a:solidFill>
-                  <a:schemeClr val="tx1"/>
-                </a:solidFill>
-                <a:latin typeface="Calibri" pitchFamily="34" charset="0"/>
-                <a:ea typeface="Geneva" pitchFamily="50" charset="-128"/>
-              </a:defRPr>
-            </a:lvl8pPr>
-            <a:lvl9pPr marL="11217275" indent="-1036638" defTabSz="2087563" eaLnBrk="0" fontAlgn="base" hangingPunct="0">
-              <a:spcBef>
-                <a:spcPct val="20000"/>
-              </a:spcBef>
-              <a:spcAft>
-                <a:spcPct val="0"/>
-              </a:spcAft>
-              <a:buFont typeface="Arial" charset="0"/>
-              <a:buChar char="»"/>
-              <a:defRPr sz="9100">
-                <a:solidFill>
-                  <a:schemeClr val="tx1"/>
-                </a:solidFill>
-                <a:latin typeface="Calibri" pitchFamily="34" charset="0"/>
-                <a:ea typeface="Geneva" pitchFamily="50" charset="-128"/>
-              </a:defRPr>
-            </a:lvl9pPr>
-          </a:lstStyle>
-          <a:p>
-            <a:pPr eaLnBrk="1" hangingPunct="1">
-              <a:lnSpc>
-                <a:spcPct val="126000"/>
-              </a:lnSpc>
-              <a:spcBef>
-                <a:spcPts val="1800"/>
-              </a:spcBef>
-              <a:buNone/>
-              <a:defRPr/>
-            </a:pPr>
-            <a:r>
-              <a:rPr lang="en-US" altLang="en-US" sz="6000" b="1" dirty="0">
-                <a:solidFill>
-                  <a:srgbClr val="2B86B9"/>
-                </a:solidFill>
-                <a:latin typeface="Arial" charset="0"/>
-                <a:cs typeface="Arial" charset="0"/>
-              </a:rPr>
-              <a:t>Data Preparation</a:t>
-            </a:r>
-          </a:p>
-          <a:p>
-            <a:pPr marL="571500" indent="-571500" eaLnBrk="1" hangingPunct="1">
-              <a:spcBef>
-                <a:spcPts val="1800"/>
-              </a:spcBef>
-              <a:buClr>
-                <a:srgbClr val="2B86B9"/>
-              </a:buClr>
-              <a:buSzPct val="120000"/>
-              <a:buFont typeface="Wingdings" panose="05000000000000000000" pitchFamily="2" charset="2"/>
-              <a:buChar char="§"/>
-              <a:defRPr/>
-            </a:pPr>
-            <a:r>
-              <a:rPr lang="en-US" altLang="en-US" sz="4400" dirty="0">
-                <a:latin typeface="Arial" charset="0"/>
-                <a:cs typeface="Arial" charset="0"/>
-              </a:rPr>
-              <a:t>People detection and tracking</a:t>
-            </a:r>
-          </a:p>
-          <a:p>
-            <a:pPr marL="571500" indent="-571500" eaLnBrk="1" hangingPunct="1">
-              <a:spcBef>
-                <a:spcPts val="1800"/>
-              </a:spcBef>
-              <a:buClr>
-                <a:srgbClr val="2B86B9"/>
-              </a:buClr>
-              <a:buSzPct val="120000"/>
-              <a:buFont typeface="Wingdings" panose="05000000000000000000" pitchFamily="2" charset="2"/>
-              <a:buChar char="§"/>
-              <a:defRPr/>
-            </a:pPr>
-            <a:r>
-              <a:rPr lang="en-US" altLang="en-US" sz="4400" dirty="0">
-                <a:latin typeface="Arial" charset="0"/>
-                <a:cs typeface="Arial" charset="0"/>
-              </a:rPr>
-              <a:t>Learning human interaction models</a:t>
-            </a:r>
-          </a:p>
-          <a:p>
-            <a:pPr marL="571500" indent="-571500" eaLnBrk="1" hangingPunct="1">
-              <a:spcBef>
-                <a:spcPts val="1800"/>
-              </a:spcBef>
-              <a:buClr>
-                <a:srgbClr val="2B86B9"/>
-              </a:buClr>
-              <a:buSzPct val="120000"/>
-              <a:buFont typeface="Wingdings" panose="05000000000000000000" pitchFamily="2" charset="2"/>
-              <a:buChar char="§"/>
-              <a:defRPr/>
-            </a:pPr>
-            <a:r>
-              <a:rPr lang="en-US" altLang="en-US" sz="4400" dirty="0">
-                <a:latin typeface="Arial" charset="0"/>
-                <a:cs typeface="Arial" charset="0"/>
-              </a:rPr>
-              <a:t>Space-time motion planning</a:t>
-            </a:r>
-          </a:p>
-          <a:p>
-            <a:pPr marL="571500" indent="-571500" eaLnBrk="1" hangingPunct="1">
-              <a:spcBef>
-                <a:spcPts val="1800"/>
-              </a:spcBef>
-              <a:buClr>
-                <a:srgbClr val="2B86B9"/>
-              </a:buClr>
-              <a:buSzPct val="120000"/>
-              <a:buFont typeface="Wingdings" panose="05000000000000000000" pitchFamily="2" charset="2"/>
-              <a:buChar char="§"/>
-              <a:defRPr/>
-            </a:pPr>
-            <a:r>
-              <a:rPr lang="en-US" altLang="en-US" sz="4400" dirty="0">
-                <a:latin typeface="Arial" charset="0"/>
-                <a:cs typeface="Arial" charset="0"/>
-              </a:rPr>
-              <a:t>Millimeter radar for detection of fast vehicles</a:t>
-            </a:r>
-          </a:p>
-        </p:txBody>
-      </p:sp>
-      <p:sp>
-        <p:nvSpPr>
-          <p:cNvPr id="54" name="Textplatzhalter 3"/>
+          <p:cNvPr id="54" name="Textplatzhalter 3 4"/>
           <p:cNvSpPr>
             <a:spLocks/>
           </p:cNvSpPr>
@@ -5154,7 +5243,7 @@
             </a:r>
           </a:p>
           <a:p>
-            <a:pPr marL="571500" indent="-571500" eaLnBrk="1" hangingPunct="1">
+            <a:pPr eaLnBrk="1" hangingPunct="1">
               <a:spcBef>
                 <a:spcPts val="1800"/>
               </a:spcBef>
@@ -5162,17 +5251,9 @@
                 <a:srgbClr val="2B86B9"/>
               </a:buClr>
               <a:buSzPct val="120000"/>
-              <a:buFont typeface="Wingdings" panose="05000000000000000000" pitchFamily="2" charset="2"/>
-              <a:buChar char="§"/>
+              <a:buNone/>
               <a:defRPr/>
             </a:pPr>
-            <a:r>
-              <a:rPr lang="en-US" altLang="en-US" sz="4400" dirty="0" err="1">
-                <a:latin typeface="Arial" charset="0"/>
-                <a:cs typeface="Arial" charset="0"/>
-              </a:rPr>
-              <a:t>asdf</a:t>
-            </a:r>
             <a:endParaRPr lang="en-US" altLang="en-US" sz="4400" dirty="0">
               <a:latin typeface="Arial" charset="0"/>
               <a:cs typeface="Arial" charset="0"/>
@@ -5182,7 +5263,7 @@
       </p:sp>
       <p:sp>
         <p:nvSpPr>
-          <p:cNvPr id="55" name="Textplatzhalter 3"/>
+          <p:cNvPr id="55" name="Textplatzhalter 3 5"/>
           <p:cNvSpPr>
             <a:spLocks/>
           </p:cNvSpPr>
@@ -5191,7 +5272,7 @@
         <p:spPr bwMode="auto">
           <a:xfrm>
             <a:off x="15401017" y="24435876"/>
-            <a:ext cx="13258800" cy="2979277"/>
+            <a:ext cx="13258800" cy="4564326"/>
           </a:xfrm>
           <a:prstGeom prst="rect">
             <a:avLst/>
@@ -5384,7 +5465,7 @@
                 <a:latin typeface="Arial" charset="0"/>
                 <a:cs typeface="Arial" charset="0"/>
               </a:rPr>
-              <a:t>Outlook</a:t>
+              <a:t>Outlook &amp; Future Work</a:t>
             </a:r>
           </a:p>
           <a:p>
@@ -5443,11 +5524,32 @@
               <a:t>Using multivariate temporal input</a:t>
             </a:r>
           </a:p>
+          <a:p>
+            <a:pPr marL="571500" indent="-571500" eaLnBrk="1" hangingPunct="1">
+              <a:spcBef>
+                <a:spcPts val="1800"/>
+              </a:spcBef>
+              <a:buClr>
+                <a:srgbClr val="2B86B9"/>
+              </a:buClr>
+              <a:buSzPct val="120000"/>
+              <a:buFont typeface="Wingdings" panose="05000000000000000000" pitchFamily="2" charset="2"/>
+              <a:buChar char="§"/>
+              <a:defRPr/>
+            </a:pPr>
+            <a:r>
+              <a:rPr lang="en-US" altLang="en-US" sz="4400" dirty="0">
+                <a:latin typeface="Arial" charset="0"/>
+                <a:cs typeface="Arial" charset="0"/>
+              </a:rPr>
+              <a:t>Estimate upper and lower bounds of validation accuracy</a:t>
+            </a:r>
+          </a:p>
         </p:txBody>
       </p:sp>
       <p:sp>
         <p:nvSpPr>
-          <p:cNvPr id="30" name="Line 191"/>
+          <p:cNvPr id="30" name="Line 191 4"/>
           <p:cNvSpPr>
             <a:spLocks noChangeShapeType="1"/>
           </p:cNvSpPr>
@@ -5498,7 +5600,7 @@
       </p:sp>
       <p:sp>
         <p:nvSpPr>
-          <p:cNvPr id="22" name="Textplatzhalter 3">
+          <p:cNvPr id="22" name="Textplatzhalter 3 6">
             <a:extLst>
               <a:ext uri="{FF2B5EF4-FFF2-40B4-BE49-F238E27FC236}">
                 <a16:creationId xmlns:a16="http://schemas.microsoft.com/office/drawing/2014/main" id="{3A40489C-474C-41AB-BDEF-71A805FF8BEF}"/>
@@ -5802,6 +5904,100 @@
           </a:p>
         </p:txBody>
       </p:sp>
+      <p:pic>
+        <p:nvPicPr>
+          <p:cNvPr id="5" name="Picture 4">
+            <a:extLst>
+              <a:ext uri="{FF2B5EF4-FFF2-40B4-BE49-F238E27FC236}">
+                <a16:creationId xmlns:a16="http://schemas.microsoft.com/office/drawing/2014/main" id="{51C5D699-EB2E-4575-BAD6-0EB6E001DB85}"/>
+              </a:ext>
+            </a:extLst>
+          </p:cNvPr>
+          <p:cNvPicPr>
+            <a:picLocks noChangeAspect="1"/>
+          </p:cNvPicPr>
+          <p:nvPr>
+            <p:custDataLst>
+              <p:tags r:id="rId1"/>
+            </p:custDataLst>
+          </p:nvPr>
+        </p:nvPicPr>
+        <p:blipFill>
+          <a:blip r:embed="rId5"/>
+          <a:stretch>
+            <a:fillRect/>
+          </a:stretch>
+        </p:blipFill>
+        <p:spPr>
+          <a:xfrm>
+            <a:off x="916086" y="26087291"/>
+            <a:ext cx="13645445" cy="7064131"/>
+          </a:xfrm>
+          <a:prstGeom prst="rect">
+            <a:avLst/>
+          </a:prstGeom>
+        </p:spPr>
+      </p:pic>
+      <p:pic>
+        <p:nvPicPr>
+          <p:cNvPr id="38" name="Picture 37">
+            <a:extLst>
+              <a:ext uri="{FF2B5EF4-FFF2-40B4-BE49-F238E27FC236}">
+                <a16:creationId xmlns:a16="http://schemas.microsoft.com/office/drawing/2014/main" id="{B9131E9E-A3AD-4A78-AC09-10DBBC557196}"/>
+              </a:ext>
+            </a:extLst>
+          </p:cNvPr>
+          <p:cNvPicPr>
+            <a:picLocks noChangeAspect="1"/>
+          </p:cNvPicPr>
+          <p:nvPr/>
+        </p:nvPicPr>
+        <p:blipFill>
+          <a:blip r:embed="rId6"/>
+          <a:stretch>
+            <a:fillRect/>
+          </a:stretch>
+        </p:blipFill>
+        <p:spPr>
+          <a:xfrm>
+            <a:off x="20510694" y="17534688"/>
+            <a:ext cx="8337802" cy="6091089"/>
+          </a:xfrm>
+          <a:prstGeom prst="rect">
+            <a:avLst/>
+          </a:prstGeom>
+        </p:spPr>
+      </p:pic>
+      <p:pic>
+        <p:nvPicPr>
+          <p:cNvPr id="39" name="Picture 38">
+            <a:extLst>
+              <a:ext uri="{FF2B5EF4-FFF2-40B4-BE49-F238E27FC236}">
+                <a16:creationId xmlns:a16="http://schemas.microsoft.com/office/drawing/2014/main" id="{B3A4D0DA-CF4E-4214-A806-178A5E86AD0D}"/>
+              </a:ext>
+            </a:extLst>
+          </p:cNvPr>
+          <p:cNvPicPr>
+            <a:picLocks noChangeAspect="1"/>
+          </p:cNvPicPr>
+          <p:nvPr/>
+        </p:nvPicPr>
+        <p:blipFill>
+          <a:blip r:embed="rId7"/>
+          <a:stretch>
+            <a:fillRect/>
+          </a:stretch>
+        </p:blipFill>
+        <p:spPr>
+          <a:xfrm>
+            <a:off x="16597154" y="12554787"/>
+            <a:ext cx="12270093" cy="4648200"/>
+          </a:xfrm>
+          <a:prstGeom prst="rect">
+            <a:avLst/>
+          </a:prstGeom>
+        </p:spPr>
+      </p:pic>
     </p:spTree>
   </p:cSld>
   <p:clrMapOvr>
@@ -5819,6 +6015,25 @@
   <p:tag name="FIRSTAISUSER@HJIQXWZCYIBGQKYO" val="3996"/>
   <p:tag name="DEFAULTDISPLAYSOURCE" val="\documentclass{article}\pagestyle{empty}&#10;\begin{document}&#10;&#10;\end{document}&#10;"/>
   <p:tag name="EMBEDFONTS" val="1"/>
+</p:tagLst>
+</file>
+
+<file path=ppt/tags/tag2.xml><?xml version="1.0" encoding="utf-8"?>
+<p:tagLst xmlns:a="http://schemas.openxmlformats.org/drawingml/2006/main" xmlns:r="http://schemas.openxmlformats.org/officeDocument/2006/relationships" xmlns:p="http://schemas.openxmlformats.org/presentationml/2006/main">
+  <p:tag name="OUTPUTDPI" val="1200"/>
+  <p:tag name="ORIGINALHEIGHT" val="2515,186"/>
+  <p:tag name="ORIGINALWIDTH" val="4856,393"/>
+  <p:tag name="LATEXADDIN" val="\documentclass{article}&#10;\usepackage{amsmath}&#10;\usepackage{multirow}&#10;\usepackage{booktabs}&#10;\pagestyle{empty}&#10;\begin{document}&#10;&#10;\newcommand{\ra}[1]{\renewcommand{\arraystretch}{#1}}&#10;\begin{table*}\centering&#10;\ra{1.3}&#10;\begin{tabular}{@{}lrrrcrrr@{}}\toprule&#10;&amp; \multicolumn{3}{c}{Single model} &amp; \phantom{abc}&amp; \multicolumn{3}{c}{Ensemble (5 models)}\\&#10;\cmidrule{2-4} \cmidrule{6-8}&#10;&amp; MSE &amp; RMSE &amp; Max. Error &amp;&amp; MSE &amp; RMSE &amp; Max. Error\\ \midrule&#10;$MLP$\\&#10; &amp; ? &amp; ? &amp; ? &amp;&amp; ? &amp; ? &amp; ? \\&#10;\midrule&#10;$RNN$\\&#10; \hspace{0.2cm} Pre-Conditional&amp; $63.27$ &amp; $7.65$ &amp; $53.96$ &amp;&amp; $62.36$ &amp; $7.6$ &amp; $53.94$ \\&#10; \hspace{0.2cm} Inter-Conditional&amp; ? &amp; ? &amp; ? &amp;&amp; ? &amp; ? &amp; ? \\&#10;\hspace{0.2cm} Post-Conditional &amp; ? &amp; ? &amp; ? &amp;&amp; ? &amp; ? &amp; ? \\&#10;\midrule&#10;$Encoder-Decoder$\\&#10; \hspace{0.2cm} Pre-Conditional&amp; $4.47$ &amp; $2.03$ &amp; ? &amp;&amp; ? &amp; ? &amp; ? \\&#10;\bottomrule&#10;\end{tabular}&#10;\caption{Experimental Results. Single models are averaged over five runs.}&#10;\end{table*}&#10;&#10;\end{document}"/>
+  <p:tag name="IGUANATEXSIZE" val="32"/>
+  <p:tag name="IGUANATEXCURSOR" val="764"/>
+  <p:tag name="TRANSPARENCY" val="True"/>
+  <p:tag name="FILENAME" val=""/>
+  <p:tag name="LATEXENGINEID" val="0"/>
+  <p:tag name="TEMPFOLDER" val="c:\temp\"/>
+  <p:tag name="LATEXFORMHEIGHT" val="312"/>
+  <p:tag name="LATEXFORMWIDTH" val="384"/>
+  <p:tag name="LATEXFORMWRAP" val="True"/>
+  <p:tag name="BITMAPVECTOR" val="0"/>
 </p:tagLst>
 </file>
 

</xml_diff>

<commit_message>
Added box plots and added all data for table but mlp
</commit_message>
<xml_diff>
--- a/Poster.pptx
+++ b/Poster.pptx
@@ -198,12 +198,12 @@
   <pc:docChgLst>
     <pc:chgData name="Simon Schrodi" userId="81bc418df28a388d" providerId="LiveId" clId="{71DDAB47-B9AD-4D8A-87D2-C8342A0DA6E2}"/>
     <pc:docChg chg="undo custSel modSld">
-      <pc:chgData name="Simon Schrodi" userId="81bc418df28a388d" providerId="LiveId" clId="{71DDAB47-B9AD-4D8A-87D2-C8342A0DA6E2}" dt="2020-02-18T13:12:41.358" v="604" actId="1038"/>
+      <pc:chgData name="Simon Schrodi" userId="81bc418df28a388d" providerId="LiveId" clId="{71DDAB47-B9AD-4D8A-87D2-C8342A0DA6E2}" dt="2020-02-18T18:58:33.107" v="635" actId="20577"/>
       <pc:docMkLst>
         <pc:docMk/>
       </pc:docMkLst>
       <pc:sldChg chg="addSp delSp modSp">
-        <pc:chgData name="Simon Schrodi" userId="81bc418df28a388d" providerId="LiveId" clId="{71DDAB47-B9AD-4D8A-87D2-C8342A0DA6E2}" dt="2020-02-18T13:12:41.358" v="604" actId="1038"/>
+        <pc:chgData name="Simon Schrodi" userId="81bc418df28a388d" providerId="LiveId" clId="{71DDAB47-B9AD-4D8A-87D2-C8342A0DA6E2}" dt="2020-02-18T18:58:33.107" v="635" actId="20577"/>
         <pc:sldMkLst>
           <pc:docMk/>
           <pc:sldMk cId="0" sldId="259"/>
@@ -249,7 +249,7 @@
           </ac:spMkLst>
         </pc:spChg>
         <pc:spChg chg="mod">
-          <ac:chgData name="Simon Schrodi" userId="81bc418df28a388d" providerId="LiveId" clId="{71DDAB47-B9AD-4D8A-87D2-C8342A0DA6E2}" dt="2020-02-13T09:33:20.408" v="111"/>
+          <ac:chgData name="Simon Schrodi" userId="81bc418df28a388d" providerId="LiveId" clId="{71DDAB47-B9AD-4D8A-87D2-C8342A0DA6E2}" dt="2020-02-18T18:58:33.107" v="635" actId="20577"/>
           <ac:spMkLst>
             <pc:docMk/>
             <pc:sldMk cId="0" sldId="259"/>
@@ -304,8 +304,8 @@
             <ac:picMk id="3" creationId="{355A9807-A193-4EBD-AB9F-BB1C89F95B65}"/>
           </ac:picMkLst>
         </pc:picChg>
-        <pc:picChg chg="mod ord">
-          <ac:chgData name="Simon Schrodi" userId="81bc418df28a388d" providerId="LiveId" clId="{71DDAB47-B9AD-4D8A-87D2-C8342A0DA6E2}" dt="2020-02-18T13:12:41.358" v="604" actId="1038"/>
+        <pc:picChg chg="del mod ord">
+          <ac:chgData name="Simon Schrodi" userId="81bc418df28a388d" providerId="LiveId" clId="{71DDAB47-B9AD-4D8A-87D2-C8342A0DA6E2}" dt="2020-02-18T13:14:55.876" v="618" actId="478"/>
           <ac:picMkLst>
             <pc:docMk/>
             <pc:sldMk cId="0" sldId="259"/>
@@ -329,11 +329,27 @@
           </ac:picMkLst>
         </pc:picChg>
         <pc:picChg chg="del mod ord">
+          <ac:chgData name="Simon Schrodi" userId="81bc418df28a388d" providerId="LiveId" clId="{71DDAB47-B9AD-4D8A-87D2-C8342A0DA6E2}" dt="2020-02-18T18:55:12.362" v="632" actId="478"/>
+          <ac:picMkLst>
+            <pc:docMk/>
+            <pc:sldMk cId="0" sldId="259"/>
+            <ac:picMk id="7" creationId="{A93831B9-3FC7-4400-AF2F-54621EE4CF3A}"/>
+          </ac:picMkLst>
+        </pc:picChg>
+        <pc:picChg chg="del mod ord">
           <ac:chgData name="Simon Schrodi" userId="81bc418df28a388d" providerId="LiveId" clId="{71DDAB47-B9AD-4D8A-87D2-C8342A0DA6E2}" dt="2020-02-13T09:36:04.792" v="156" actId="478"/>
           <ac:picMkLst>
             <pc:docMk/>
             <pc:sldMk cId="0" sldId="259"/>
             <ac:picMk id="9" creationId="{C14017DB-F362-40FE-9DCA-210DD7F3526B}"/>
+          </ac:picMkLst>
+        </pc:picChg>
+        <pc:picChg chg="mod ord">
+          <ac:chgData name="Simon Schrodi" userId="81bc418df28a388d" providerId="LiveId" clId="{71DDAB47-B9AD-4D8A-87D2-C8342A0DA6E2}" dt="2020-02-18T18:58:07.515" v="633" actId="1038"/>
+          <ac:picMkLst>
+            <pc:docMk/>
+            <pc:sldMk cId="0" sldId="259"/>
+            <ac:picMk id="9" creationId="{CDE80310-78C8-488C-8F67-66C3B6CDFA2F}"/>
           </ac:picMkLst>
         </pc:picChg>
         <pc:picChg chg="del mod ord">
@@ -5906,10 +5922,10 @@
       </p:sp>
       <p:pic>
         <p:nvPicPr>
-          <p:cNvPr id="5" name="Picture 4">
+          <p:cNvPr id="9" name="Picture 8">
             <a:extLst>
               <a:ext uri="{FF2B5EF4-FFF2-40B4-BE49-F238E27FC236}">
-                <a16:creationId xmlns:a16="http://schemas.microsoft.com/office/drawing/2014/main" id="{51C5D699-EB2E-4575-BAD6-0EB6E001DB85}"/>
+                <a16:creationId xmlns:a16="http://schemas.microsoft.com/office/drawing/2014/main" id="{CDE80310-78C8-488C-8F67-66C3B6CDFA2F}"/>
               </a:ext>
             </a:extLst>
           </p:cNvPr>
@@ -5930,8 +5946,8 @@
         </p:blipFill>
         <p:spPr>
           <a:xfrm>
-            <a:off x="916086" y="26087291"/>
-            <a:ext cx="13645445" cy="7064131"/>
+            <a:off x="952283" y="26087291"/>
+            <a:ext cx="13647653" cy="7417590"/>
           </a:xfrm>
           <a:prstGeom prst="rect">
             <a:avLst/>
@@ -6021,11 +6037,11 @@
 <file path=ppt/tags/tag2.xml><?xml version="1.0" encoding="utf-8"?>
 <p:tagLst xmlns:a="http://schemas.openxmlformats.org/drawingml/2006/main" xmlns:r="http://schemas.openxmlformats.org/officeDocument/2006/relationships" xmlns:p="http://schemas.openxmlformats.org/presentationml/2006/main">
   <p:tag name="OUTPUTDPI" val="1200"/>
-  <p:tag name="ORIGINALHEIGHT" val="2515,186"/>
+  <p:tag name="ORIGINALHEIGHT" val="2640,42"/>
   <p:tag name="ORIGINALWIDTH" val="4856,393"/>
-  <p:tag name="LATEXADDIN" val="\documentclass{article}&#10;\usepackage{amsmath}&#10;\usepackage{multirow}&#10;\usepackage{booktabs}&#10;\pagestyle{empty}&#10;\begin{document}&#10;&#10;\newcommand{\ra}[1]{\renewcommand{\arraystretch}{#1}}&#10;\begin{table*}\centering&#10;\ra{1.3}&#10;\begin{tabular}{@{}lrrrcrrr@{}}\toprule&#10;&amp; \multicolumn{3}{c}{Single model} &amp; \phantom{abc}&amp; \multicolumn{3}{c}{Ensemble (5 models)}\\&#10;\cmidrule{2-4} \cmidrule{6-8}&#10;&amp; MSE &amp; RMSE &amp; Max. Error &amp;&amp; MSE &amp; RMSE &amp; Max. Error\\ \midrule&#10;$MLP$\\&#10; &amp; ? &amp; ? &amp; ? &amp;&amp; ? &amp; ? &amp; ? \\&#10;\midrule&#10;$RNN$\\&#10; \hspace{0.2cm} Pre-Conditional&amp; $63.27$ &amp; $7.65$ &amp; $53.96$ &amp;&amp; $62.36$ &amp; $7.6$ &amp; $53.94$ \\&#10; \hspace{0.2cm} Inter-Conditional&amp; ? &amp; ? &amp; ? &amp;&amp; ? &amp; ? &amp; ? \\&#10;\hspace{0.2cm} Post-Conditional &amp; ? &amp; ? &amp; ? &amp;&amp; ? &amp; ? &amp; ? \\&#10;\midrule&#10;$Encoder-Decoder$\\&#10; \hspace{0.2cm} Pre-Conditional&amp; $4.47$ &amp; $2.03$ &amp; ? &amp;&amp; ? &amp; ? &amp; ? \\&#10;\bottomrule&#10;\end{tabular}&#10;\caption{Experimental Results. Single models are averaged over five runs.}&#10;\end{table*}&#10;&#10;\end{document}"/>
+  <p:tag name="LATEXADDIN" val="\documentclass{article}&#10;\usepackage{amsmath}&#10;\usepackage{multirow}&#10;\usepackage{booktabs}&#10;\pagestyle{empty}&#10;\begin{document}&#10;&#10;\newcommand{\ra}[1]{\renewcommand{\arraystretch}{#1}}&#10;\begin{table*}\centering&#10;\ra{1.3}&#10;\begin{tabular}{@{}lrrrcrrr@{}}\toprule&#10;&amp; \multicolumn{3}{c}{Single model} &amp; \phantom{abc}&amp; \multicolumn{3}{c}{Ensemble (5 models)}\\&#10;\cmidrule{2-4} \cmidrule{6-8}&#10;&amp; MSE &amp; RMSE &amp; Max. Error &amp;&amp; MSE &amp; RMSE &amp; Max. Error\\ \midrule&#10;$MLP$\\&#10; &amp; ? &amp; ? &amp; ? &amp;&amp; ? &amp; ? &amp; ? \\&#10;\midrule&#10;$RNN$\\&#10; \hspace{0.2cm} Pre-Conditional&amp; $63.27$ &amp; $7.65$ &amp; $53.96$ &amp;&amp; $62.36$ &amp; $7.6$ &amp; $53.94$ \\&#10; \hspace{0.2cm} Inter-Conditional&amp; $63.3$ &amp; $7.65$ &amp; $54.18$ &amp;&amp; $63.28$ &amp; $7.65$ &amp; $54.19$ \\&#10;\hspace{0.2cm} Post-Conditional &amp; ? &amp; ? &amp; ? &amp;&amp; ? &amp; ? &amp; ? \\&#10;\midrule&#10;$Encoder-Decoder$\\&#10; \hspace{0.2cm} Pre-Conditional&amp; $4.47$ &amp; $2.03$ &amp; ? &amp;&amp; ? &amp; ? &amp; ? \\&#10;\bottomrule&#10;\end{tabular}&#10;\caption{Experimental results on test set. Single models are averaged over five runs.}&#10;\end{table*}&#10;&#10;\end{document}"/>
   <p:tag name="IGUANATEXSIZE" val="32"/>
-  <p:tag name="IGUANATEXCURSOR" val="764"/>
+  <p:tag name="IGUANATEXCURSOR" val="676"/>
   <p:tag name="TRANSPARENCY" val="True"/>
   <p:tag name="FILENAME" val=""/>
   <p:tag name="LATEXENGINEID" val="0"/>

</xml_diff>